<commit_message>
Format and color changes
</commit_message>
<xml_diff>
--- a/5PY_PPT.pptx
+++ b/5PY_PPT.pptx
@@ -3331,7 +3331,7 @@
           <p:cNvPr id="2" name="slide2" descr="Overview">
             <a:extLst>
               <a:ext uri="{FF2B5EF4-FFF2-40B4-BE49-F238E27FC236}">
-                <a16:creationId xmlns:a16="http://schemas.microsoft.com/office/drawing/2014/main" id="{72473189-A53B-4017-8C87-50B892A6C9DE}"/>
+                <a16:creationId xmlns:a16="http://schemas.microsoft.com/office/drawing/2014/main" id="{5B811964-5528-420F-BCF1-23CE2F406FF1}"/>
               </a:ext>
             </a:extLst>
           </p:cNvPr>
@@ -3354,8 +3354,8 @@
         </p:blipFill>
         <p:spPr>
           <a:xfrm>
-            <a:off x="0" y="926"/>
-            <a:ext cx="12192000" cy="6856147"/>
+            <a:off x="0" y="1389"/>
+            <a:ext cx="12192001" cy="6855220"/>
           </a:xfrm>
           <a:prstGeom prst="rect">
             <a:avLst/>

</xml_diff>